<commit_message>
IBAN added to payment disruption scheme
</commit_message>
<xml_diff>
--- a/payments/payment-decentralization-scheme-1a.pptx
+++ b/payments/payment-decentralization-scheme-1a.pptx
@@ -288,7 +288,7 @@
           <a:p>
             <a:fld id="{E3744D7E-A5BB-4306-A750-C25515017678}" type="datetimeFigureOut">
               <a:rPr lang="en-US" smtClean="0"/>
-              <a:t>2016-12-16</a:t>
+              <a:t>2017-07-15</a:t>
             </a:fld>
             <a:endParaRPr lang="en-US"/>
           </a:p>
@@ -458,7 +458,7 @@
           <a:p>
             <a:fld id="{E3744D7E-A5BB-4306-A750-C25515017678}" type="datetimeFigureOut">
               <a:rPr lang="en-US" smtClean="0"/>
-              <a:t>2016-12-16</a:t>
+              <a:t>2017-07-15</a:t>
             </a:fld>
             <a:endParaRPr lang="en-US"/>
           </a:p>
@@ -638,7 +638,7 @@
           <a:p>
             <a:fld id="{E3744D7E-A5BB-4306-A750-C25515017678}" type="datetimeFigureOut">
               <a:rPr lang="en-US" smtClean="0"/>
-              <a:t>2016-12-16</a:t>
+              <a:t>2017-07-15</a:t>
             </a:fld>
             <a:endParaRPr lang="en-US"/>
           </a:p>
@@ -808,7 +808,7 @@
           <a:p>
             <a:fld id="{E3744D7E-A5BB-4306-A750-C25515017678}" type="datetimeFigureOut">
               <a:rPr lang="en-US" smtClean="0"/>
-              <a:t>2016-12-16</a:t>
+              <a:t>2017-07-15</a:t>
             </a:fld>
             <a:endParaRPr lang="en-US"/>
           </a:p>
@@ -1054,7 +1054,7 @@
           <a:p>
             <a:fld id="{E3744D7E-A5BB-4306-A750-C25515017678}" type="datetimeFigureOut">
               <a:rPr lang="en-US" smtClean="0"/>
-              <a:t>2016-12-16</a:t>
+              <a:t>2017-07-15</a:t>
             </a:fld>
             <a:endParaRPr lang="en-US"/>
           </a:p>
@@ -1342,7 +1342,7 @@
           <a:p>
             <a:fld id="{E3744D7E-A5BB-4306-A750-C25515017678}" type="datetimeFigureOut">
               <a:rPr lang="en-US" smtClean="0"/>
-              <a:t>2016-12-16</a:t>
+              <a:t>2017-07-15</a:t>
             </a:fld>
             <a:endParaRPr lang="en-US"/>
           </a:p>
@@ -1764,7 +1764,7 @@
           <a:p>
             <a:fld id="{E3744D7E-A5BB-4306-A750-C25515017678}" type="datetimeFigureOut">
               <a:rPr lang="en-US" smtClean="0"/>
-              <a:t>2016-12-16</a:t>
+              <a:t>2017-07-15</a:t>
             </a:fld>
             <a:endParaRPr lang="en-US"/>
           </a:p>
@@ -1882,7 +1882,7 @@
           <a:p>
             <a:fld id="{E3744D7E-A5BB-4306-A750-C25515017678}" type="datetimeFigureOut">
               <a:rPr lang="en-US" smtClean="0"/>
-              <a:t>2016-12-16</a:t>
+              <a:t>2017-07-15</a:t>
             </a:fld>
             <a:endParaRPr lang="en-US"/>
           </a:p>
@@ -1977,7 +1977,7 @@
           <a:p>
             <a:fld id="{E3744D7E-A5BB-4306-A750-C25515017678}" type="datetimeFigureOut">
               <a:rPr lang="en-US" smtClean="0"/>
-              <a:t>2016-12-16</a:t>
+              <a:t>2017-07-15</a:t>
             </a:fld>
             <a:endParaRPr lang="en-US"/>
           </a:p>
@@ -2254,7 +2254,7 @@
           <a:p>
             <a:fld id="{E3744D7E-A5BB-4306-A750-C25515017678}" type="datetimeFigureOut">
               <a:rPr lang="en-US" smtClean="0"/>
-              <a:t>2016-12-16</a:t>
+              <a:t>2017-07-15</a:t>
             </a:fld>
             <a:endParaRPr lang="en-US"/>
           </a:p>
@@ -2507,7 +2507,7 @@
           <a:p>
             <a:fld id="{E3744D7E-A5BB-4306-A750-C25515017678}" type="datetimeFigureOut">
               <a:rPr lang="en-US" smtClean="0"/>
-              <a:t>2016-12-16</a:t>
+              <a:t>2017-07-15</a:t>
             </a:fld>
             <a:endParaRPr lang="en-US"/>
           </a:p>
@@ -2720,7 +2720,7 @@
           <a:p>
             <a:fld id="{E3744D7E-A5BB-4306-A750-C25515017678}" type="datetimeFigureOut">
               <a:rPr lang="en-US" smtClean="0"/>
-              <a:t>2016-12-16</a:t>
+              <a:t>2017-07-15</a:t>
             </a:fld>
             <a:endParaRPr lang="en-US"/>
           </a:p>
@@ -3103,7 +3103,7 @@
         </p:nvSpPr>
         <p:spPr>
           <a:xfrm rot="16845960">
-            <a:off x="1634498" y="1458745"/>
+            <a:off x="1634498" y="1314729"/>
             <a:ext cx="198210" cy="998112"/>
           </a:xfrm>
           <a:prstGeom prst="upArrow">
@@ -3155,7 +3155,7 @@
         </p:nvCxnSpPr>
         <p:spPr>
           <a:xfrm>
-            <a:off x="-2760" y="4520153"/>
+            <a:off x="-2760" y="4376137"/>
             <a:ext cx="9104238" cy="0"/>
           </a:xfrm>
           <a:prstGeom prst="line">
@@ -3483,7 +3483,7 @@
         </p:nvGrpSpPr>
         <p:grpSpPr>
           <a:xfrm>
-            <a:off x="899592" y="4941168"/>
+            <a:off x="899592" y="4869160"/>
             <a:ext cx="2808312" cy="864096"/>
             <a:chOff x="1599996" y="5157192"/>
             <a:chExt cx="2808312" cy="864096"/>
@@ -3609,10 +3609,10 @@
         </p:nvGrpSpPr>
         <p:grpSpPr>
           <a:xfrm>
-            <a:off x="5070118" y="4949652"/>
-            <a:ext cx="3642192" cy="864096"/>
-            <a:chOff x="5394304" y="5165676"/>
-            <a:chExt cx="3642192" cy="864096"/>
+            <a:off x="4499992" y="4797152"/>
+            <a:ext cx="4595894" cy="1016596"/>
+            <a:chOff x="5240427" y="5165676"/>
+            <a:chExt cx="4243458" cy="864096"/>
           </a:xfrm>
         </p:grpSpPr>
         <p:sp>
@@ -3623,8 +3623,8 @@
           </p:nvSpPr>
           <p:spPr>
             <a:xfrm flipH="1" flipV="1">
-              <a:off x="5394304" y="5165676"/>
-              <a:ext cx="3642192" cy="864096"/>
+              <a:off x="5240427" y="5165676"/>
+              <a:ext cx="4010069" cy="864096"/>
             </a:xfrm>
             <a:prstGeom prst="foldedCorner">
               <a:avLst>
@@ -3676,8 +3676,8 @@
           </p:nvSpPr>
           <p:spPr>
             <a:xfrm>
-              <a:off x="5568236" y="5373215"/>
-              <a:ext cx="3345788" cy="538609"/>
+              <a:off x="5394304" y="5346578"/>
+              <a:ext cx="4089581" cy="614776"/>
             </a:xfrm>
             <a:prstGeom prst="rect">
               <a:avLst/>
@@ -3705,8 +3705,56 @@
                   <a:latin typeface="Courier New" panose="02070309020205020404" pitchFamily="49" charset="0"/>
                   <a:cs typeface="Courier New" panose="02070309020205020404" pitchFamily="49" charset="0"/>
                 </a:rPr>
-                <a:t>: https://mybank.com/payment</a:t>
+                <a:t>: https://</a:t>
               </a:r>
+              <a:r>
+                <a:rPr lang="en-US" sz="1200" b="1" dirty="0" smtClean="0">
+                  <a:latin typeface="Courier New" panose="02070309020205020404" pitchFamily="49" charset="0"/>
+                  <a:cs typeface="Courier New" panose="02070309020205020404" pitchFamily="49" charset="0"/>
+                </a:rPr>
+                <a:t>mybank.com/payment</a:t>
+              </a:r>
+              <a:br>
+                <a:rPr lang="en-US" sz="1200" b="1" dirty="0" smtClean="0">
+                  <a:latin typeface="Courier New" panose="02070309020205020404" pitchFamily="49" charset="0"/>
+                  <a:cs typeface="Courier New" panose="02070309020205020404" pitchFamily="49" charset="0"/>
+                </a:rPr>
+              </a:br>
+              <a:r>
+                <a:rPr lang="en-US" sz="1200" b="1" dirty="0" smtClean="0">
+                  <a:solidFill>
+                    <a:srgbClr val="FF0000"/>
+                  </a:solidFill>
+                  <a:latin typeface="Courier New" panose="02070309020205020404" pitchFamily="49" charset="0"/>
+                  <a:cs typeface="Courier New" panose="02070309020205020404" pitchFamily="49" charset="0"/>
+                </a:rPr>
+                <a:t>Account</a:t>
+              </a:r>
+              <a:r>
+                <a:rPr lang="en-US" sz="1200" b="1" dirty="0">
+                  <a:latin typeface="Courier New" panose="02070309020205020404" pitchFamily="49" charset="0"/>
+                  <a:cs typeface="Courier New" panose="02070309020205020404" pitchFamily="49" charset="0"/>
+                </a:rPr>
+                <a:t>: </a:t>
+              </a:r>
+              <a:r>
+                <a:rPr lang="en-US" sz="1200" b="1" dirty="0" smtClean="0">
+                  <a:latin typeface="Courier New" panose="02070309020205020404" pitchFamily="49" charset="0"/>
+                  <a:cs typeface="Courier New" panose="02070309020205020404" pitchFamily="49" charset="0"/>
+                </a:rPr>
+                <a:t>FR14 2004 </a:t>
+              </a:r>
+              <a:r>
+                <a:rPr lang="en-US" sz="1200" b="1" dirty="0">
+                  <a:latin typeface="Courier New" panose="02070309020205020404" pitchFamily="49" charset="0"/>
+                  <a:cs typeface="Courier New" panose="02070309020205020404" pitchFamily="49" charset="0"/>
+                </a:rPr>
+                <a:t>1010 0505 0001 3M02 606</a:t>
+              </a:r>
+              <a:endParaRPr lang="en-US" sz="1200" b="1" dirty="0" smtClean="0">
+                <a:latin typeface="Courier New" panose="02070309020205020404" pitchFamily="49" charset="0"/>
+                <a:cs typeface="Courier New" panose="02070309020205020404" pitchFamily="49" charset="0"/>
+              </a:endParaRPr>
             </a:p>
             <a:p>
               <a:pPr>
@@ -3735,7 +3783,7 @@
         </p:nvSpPr>
         <p:spPr>
           <a:xfrm>
-            <a:off x="-2760" y="4520153"/>
+            <a:off x="-2760" y="4376137"/>
             <a:ext cx="899605" cy="276999"/>
           </a:xfrm>
           <a:prstGeom prst="rect">
@@ -3771,7 +3819,7 @@
         </p:nvSpPr>
         <p:spPr>
           <a:xfrm>
-            <a:off x="-13" y="4221088"/>
+            <a:off x="-13" y="4077072"/>
             <a:ext cx="1148071" cy="276999"/>
           </a:xfrm>
           <a:prstGeom prst="rect">
@@ -3807,7 +3855,7 @@
         </p:nvGrpSpPr>
         <p:grpSpPr>
           <a:xfrm>
-            <a:off x="251520" y="692696"/>
+            <a:off x="251520" y="548680"/>
             <a:ext cx="1126177" cy="2270624"/>
             <a:chOff x="519059" y="1734440"/>
             <a:chExt cx="1126177" cy="2270624"/>
@@ -5935,7 +5983,7 @@
         </p:nvGrpSpPr>
         <p:grpSpPr>
           <a:xfrm>
-            <a:off x="4788024" y="1518416"/>
+            <a:off x="4788024" y="1374400"/>
             <a:ext cx="1126177" cy="2270624"/>
             <a:chOff x="519059" y="1734440"/>
             <a:chExt cx="1126177" cy="2270624"/>
@@ -8063,7 +8111,7 @@
         </p:nvSpPr>
         <p:spPr>
           <a:xfrm rot="18414791">
-            <a:off x="6132776" y="2611863"/>
+            <a:off x="6132776" y="2467847"/>
             <a:ext cx="198210" cy="1183934"/>
           </a:xfrm>
           <a:prstGeom prst="upArrow">
@@ -8115,7 +8163,7 @@
         </p:nvSpPr>
         <p:spPr>
           <a:xfrm>
-            <a:off x="3347864" y="4385264"/>
+            <a:off x="3347864" y="4241248"/>
             <a:ext cx="2068554" cy="276999"/>
           </a:xfrm>
           <a:prstGeom prst="rect">
@@ -8177,7 +8225,7 @@
         </p:nvSpPr>
         <p:spPr>
           <a:xfrm>
-            <a:off x="2263612" y="1684123"/>
+            <a:off x="2263612" y="1540107"/>
             <a:ext cx="1387828" cy="925398"/>
           </a:xfrm>
           <a:prstGeom prst="ellipse">
@@ -8251,7 +8299,7 @@
         </p:nvSpPr>
         <p:spPr>
           <a:xfrm>
-            <a:off x="2676040" y="2116293"/>
+            <a:off x="2676040" y="1972277"/>
             <a:ext cx="576064" cy="376603"/>
           </a:xfrm>
           <a:prstGeom prst="flowChartMagneticDisk">
@@ -8305,7 +8353,7 @@
         </p:nvSpPr>
         <p:spPr>
           <a:xfrm>
-            <a:off x="2483769" y="1677724"/>
+            <a:off x="2483769" y="1533708"/>
             <a:ext cx="942887" cy="507832"/>
           </a:xfrm>
           <a:prstGeom prst="rect">
@@ -8355,7 +8403,7 @@
         </p:nvSpPr>
         <p:spPr>
           <a:xfrm rot="1244165">
-            <a:off x="2464784" y="2602614"/>
+            <a:off x="2464784" y="2458598"/>
             <a:ext cx="198210" cy="898288"/>
           </a:xfrm>
           <a:prstGeom prst="upArrow">
@@ -8407,7 +8455,7 @@
         </p:nvSpPr>
         <p:spPr>
           <a:xfrm>
-            <a:off x="2022908" y="1340768"/>
+            <a:off x="2022908" y="1196752"/>
             <a:ext cx="1864613" cy="276999"/>
           </a:xfrm>
           <a:prstGeom prst="rect">
@@ -8587,7 +8635,7 @@
         </p:nvSpPr>
         <p:spPr>
           <a:xfrm>
-            <a:off x="5325732" y="5960313"/>
+            <a:off x="5037700" y="5960313"/>
             <a:ext cx="3422732" cy="276999"/>
           </a:xfrm>
           <a:prstGeom prst="rect">
@@ -8670,7 +8718,14 @@
                 <a:latin typeface="Arial" panose="020B0604020202020204" pitchFamily="34" charset="0"/>
                 <a:cs typeface="Arial" panose="020B0604020202020204" pitchFamily="34" charset="0"/>
               </a:rPr>
-              <a:t>WebPKI.org/A.R. 2016-12-15</a:t>
+              <a:t>WebPKI.org/A.R. </a:t>
+            </a:r>
+            <a:r>
+              <a:rPr lang="en-US" sz="800" dirty="0" smtClean="0">
+                <a:latin typeface="Arial" panose="020B0604020202020204" pitchFamily="34" charset="0"/>
+                <a:cs typeface="Arial" panose="020B0604020202020204" pitchFamily="34" charset="0"/>
+              </a:rPr>
+              <a:t>2016-12-15</a:t>
             </a:r>
             <a:endParaRPr lang="en-US" sz="800" dirty="0">
               <a:latin typeface="Arial" panose="020B0604020202020204" pitchFamily="34" charset="0"/>
@@ -8687,7 +8742,7 @@
         </p:nvGrpSpPr>
         <p:grpSpPr>
           <a:xfrm>
-            <a:off x="6847624" y="1672923"/>
+            <a:off x="6847624" y="1528907"/>
             <a:ext cx="1260000" cy="1224000"/>
             <a:chOff x="6847624" y="1672923"/>
             <a:chExt cx="1260000" cy="1224000"/>

</xml_diff>

<commit_message>
Minor upgrade of the former...
</commit_message>
<xml_diff>
--- a/payments/payment-decentralization-scheme-1a.pptx
+++ b/payments/payment-decentralization-scheme-1a.pptx
@@ -6033,8 +6033,8 @@
         </p:nvSpPr>
         <p:spPr>
           <a:xfrm>
-            <a:off x="704190" y="6237310"/>
-            <a:ext cx="2760692" cy="276999"/>
+            <a:off x="467544" y="6237310"/>
+            <a:ext cx="3188693" cy="307777"/>
           </a:xfrm>
           <a:prstGeom prst="rect">
             <a:avLst/>
@@ -6048,20 +6048,20 @@
           <a:lstStyle/>
           <a:p>
             <a:r>
-              <a:rPr lang="en-US" sz="1200" i="1" dirty="0" smtClean="0">
+              <a:rPr lang="en-US" sz="1400" i="1" dirty="0" smtClean="0">
                 <a:latin typeface="Arial" panose="020B0604020202020204" pitchFamily="34" charset="0"/>
                 <a:cs typeface="Arial" panose="020B0604020202020204" pitchFamily="34" charset="0"/>
               </a:rPr>
               <a:t>Pre-Internet</a:t>
             </a:r>
             <a:r>
-              <a:rPr lang="en-US" sz="1200" dirty="0" smtClean="0">
+              <a:rPr lang="en-US" sz="1400" dirty="0" smtClean="0">
                 <a:latin typeface="Arial" panose="020B0604020202020204" pitchFamily="34" charset="0"/>
                 <a:cs typeface="Arial" panose="020B0604020202020204" pitchFamily="34" charset="0"/>
               </a:rPr>
               <a:t> Payment Card Credential</a:t>
             </a:r>
-            <a:endParaRPr lang="en-US" sz="1200" dirty="0">
+            <a:endParaRPr lang="en-US" sz="1400" dirty="0">
               <a:latin typeface="Arial" panose="020B0604020202020204" pitchFamily="34" charset="0"/>
               <a:cs typeface="Arial" panose="020B0604020202020204" pitchFamily="34" charset="0"/>
             </a:endParaRPr>
@@ -7659,9 +7659,9 @@
         <p:grpSpPr>
           <a:xfrm>
             <a:off x="4283968" y="847747"/>
-            <a:ext cx="4608512" cy="5821613"/>
+            <a:ext cx="4608512" cy="5893621"/>
             <a:chOff x="4283968" y="847747"/>
-            <a:chExt cx="4608512" cy="5821613"/>
+            <a:chExt cx="4608512" cy="5893621"/>
           </a:xfrm>
         </p:grpSpPr>
         <p:grpSp>
@@ -7673,9 +7673,9 @@
           <p:grpSpPr>
             <a:xfrm>
               <a:off x="4283968" y="847747"/>
-              <a:ext cx="4608512" cy="5821613"/>
+              <a:ext cx="4608512" cy="5893621"/>
               <a:chOff x="4211960" y="908720"/>
-              <a:chExt cx="4608512" cy="5821613"/>
+              <a:chExt cx="4608512" cy="5893621"/>
             </a:xfrm>
           </p:grpSpPr>
           <p:grpSp>
@@ -7687,9 +7687,9 @@
             <p:grpSpPr>
               <a:xfrm>
                 <a:off x="4211960" y="908720"/>
-                <a:ext cx="4608512" cy="5821613"/>
+                <a:ext cx="4608512" cy="5893621"/>
                 <a:chOff x="4211960" y="908720"/>
-                <a:chExt cx="4608512" cy="5821613"/>
+                <a:chExt cx="4608512" cy="5893621"/>
               </a:xfrm>
             </p:grpSpPr>
             <p:grpSp>
@@ -10195,8 +10195,8 @@
               </p:nvSpPr>
               <p:spPr>
                 <a:xfrm>
-                  <a:off x="4770292" y="6453334"/>
-                  <a:ext cx="3422732" cy="276999"/>
+                  <a:off x="4644008" y="6494564"/>
+                  <a:ext cx="3724033" cy="307777"/>
                 </a:xfrm>
                 <a:prstGeom prst="rect">
                   <a:avLst/>
@@ -10210,41 +10210,41 @@
                 <a:lstStyle/>
                 <a:p>
                   <a:r>
-                    <a:rPr lang="en-US" sz="1200" dirty="0" smtClean="0">
+                    <a:rPr lang="en-US" sz="1400" dirty="0" smtClean="0">
                       <a:latin typeface="Arial" panose="020B0604020202020204" pitchFamily="34" charset="0"/>
                       <a:cs typeface="Arial" panose="020B0604020202020204" pitchFamily="34" charset="0"/>
                     </a:rPr>
                     <a:t>Enhanced </a:t>
                   </a:r>
                   <a:r>
-                    <a:rPr lang="en-US" sz="1200" i="1" dirty="0" smtClean="0">
+                    <a:rPr lang="en-US" sz="1400" i="1" dirty="0" smtClean="0">
                       <a:latin typeface="Arial" panose="020B0604020202020204" pitchFamily="34" charset="0"/>
                       <a:cs typeface="Arial" panose="020B0604020202020204" pitchFamily="34" charset="0"/>
                     </a:rPr>
-                    <a:t>Internet-</a:t>
+                    <a:t>Web</a:t>
                   </a:r>
                   <a:r>
-                    <a:rPr lang="en-US" sz="1200" i="1" dirty="0">
+                    <a:rPr lang="en-US" sz="1400" i="1" dirty="0" smtClean="0">
                       <a:latin typeface="Arial" panose="020B0604020202020204" pitchFamily="34" charset="0"/>
                       <a:cs typeface="Arial" panose="020B0604020202020204" pitchFamily="34" charset="0"/>
                     </a:rPr>
-                    <a:t>e</a:t>
+                    <a:t>-enabled</a:t>
                   </a:r>
                   <a:r>
-                    <a:rPr lang="en-US" sz="1200" i="1" dirty="0" smtClean="0">
+                    <a:rPr lang="en-US" sz="1400" dirty="0" smtClean="0">
                       <a:latin typeface="Arial" panose="020B0604020202020204" pitchFamily="34" charset="0"/>
                       <a:cs typeface="Arial" panose="020B0604020202020204" pitchFamily="34" charset="0"/>
                     </a:rPr>
-                    <a:t>nabled</a:t>
+                    <a:t> </a:t>
                   </a:r>
                   <a:r>
-                    <a:rPr lang="en-US" sz="1200" dirty="0" smtClean="0">
+                    <a:rPr lang="en-US" sz="1400" dirty="0" smtClean="0">
                       <a:latin typeface="Arial" panose="020B0604020202020204" pitchFamily="34" charset="0"/>
                       <a:cs typeface="Arial" panose="020B0604020202020204" pitchFamily="34" charset="0"/>
                     </a:rPr>
-                    <a:t> Payment Credential</a:t>
+                    <a:t>Payment Credential</a:t>
                   </a:r>
-                  <a:endParaRPr lang="en-US" sz="1200" dirty="0">
+                  <a:endParaRPr lang="en-US" sz="1400" dirty="0">
                     <a:latin typeface="Arial" panose="020B0604020202020204" pitchFamily="34" charset="0"/>
                     <a:cs typeface="Arial" panose="020B0604020202020204" pitchFamily="34" charset="0"/>
                   </a:endParaRPr>
@@ -12306,6 +12306,63 @@
           </p:txBody>
         </p:sp>
       </p:grpSp>
+      <p:sp>
+        <p:nvSpPr>
+          <p:cNvPr id="248" name="TextBox 247"/>
+          <p:cNvSpPr txBox="1"/>
+          <p:nvPr/>
+        </p:nvSpPr>
+        <p:spPr>
+          <a:xfrm>
+            <a:off x="3649310" y="2542990"/>
+            <a:ext cx="780509" cy="510778"/>
+          </a:xfrm>
+          <a:prstGeom prst="roundRect">
+            <a:avLst/>
+          </a:prstGeom>
+          <a:solidFill>
+            <a:schemeClr val="bg1"/>
+          </a:solidFill>
+          <a:ln w="3175">
+            <a:solidFill>
+              <a:schemeClr val="tx1"/>
+            </a:solidFill>
+          </a:ln>
+        </p:spPr>
+        <p:txBody>
+          <a:bodyPr wrap="none" rtlCol="0">
+            <a:spAutoFit/>
+          </a:bodyPr>
+          <a:lstStyle/>
+          <a:p>
+            <a:pPr algn="ctr"/>
+            <a:r>
+              <a:rPr lang="en-US" sz="1200" dirty="0" smtClean="0">
+                <a:latin typeface="Arial" panose="020B0604020202020204" pitchFamily="34" charset="0"/>
+                <a:cs typeface="Arial" panose="020B0604020202020204" pitchFamily="34" charset="0"/>
+              </a:rPr>
+              <a:t>Recent</a:t>
+            </a:r>
+            <a:br>
+              <a:rPr lang="en-US" sz="1200" dirty="0" smtClean="0">
+                <a:latin typeface="Arial" panose="020B0604020202020204" pitchFamily="34" charset="0"/>
+                <a:cs typeface="Arial" panose="020B0604020202020204" pitchFamily="34" charset="0"/>
+              </a:rPr>
+            </a:br>
+            <a:r>
+              <a:rPr lang="en-US" sz="1200" dirty="0" smtClean="0">
+                <a:latin typeface="Arial" panose="020B0604020202020204" pitchFamily="34" charset="0"/>
+                <a:cs typeface="Arial" panose="020B0604020202020204" pitchFamily="34" charset="0"/>
+              </a:rPr>
+              <a:t>Addition</a:t>
+            </a:r>
+            <a:endParaRPr lang="en-US" sz="1200" dirty="0">
+              <a:latin typeface="Arial" panose="020B0604020202020204" pitchFamily="34" charset="0"/>
+              <a:cs typeface="Arial" panose="020B0604020202020204" pitchFamily="34" charset="0"/>
+            </a:endParaRPr>
+          </a:p>
+        </p:txBody>
+      </p:sp>
     </p:spTree>
     <p:extLst>
       <p:ext uri="{BB962C8B-B14F-4D97-AF65-F5344CB8AC3E}">

</xml_diff>